<commit_message>
Nearly finished presentation slides
</commit_message>
<xml_diff>
--- a/Presentation.pptx
+++ b/Presentation.pptx
@@ -9,6 +9,15 @@
     <p:sldId id="257" r:id="rId3"/>
     <p:sldId id="258" r:id="rId4"/>
     <p:sldId id="259" r:id="rId5"/>
+    <p:sldId id="260" r:id="rId6"/>
+    <p:sldId id="261" r:id="rId7"/>
+    <p:sldId id="262" r:id="rId8"/>
+    <p:sldId id="263" r:id="rId9"/>
+    <p:sldId id="264" r:id="rId10"/>
+    <p:sldId id="265" r:id="rId11"/>
+    <p:sldId id="266" r:id="rId12"/>
+    <p:sldId id="267" r:id="rId13"/>
+    <p:sldId id="268" r:id="rId14"/>
   </p:sldIdLst>
   <p:sldSz cx="12192000" cy="6858000"/>
   <p:notesSz cx="6858000" cy="9144000"/>
@@ -12435,6 +12444,854 @@
 </p:sld>
 </file>
 
+<file path=ppt/slides/slide10.xml><?xml version="1.0" encoding="utf-8"?>
+<p:sld xmlns:a="http://schemas.openxmlformats.org/drawingml/2006/main" xmlns:r="http://schemas.openxmlformats.org/officeDocument/2006/relationships" xmlns:p="http://schemas.openxmlformats.org/presentationml/2006/main">
+  <p:cSld>
+    <p:spTree>
+      <p:nvGrpSpPr>
+        <p:cNvPr id="1" name=""/>
+        <p:cNvGrpSpPr/>
+        <p:nvPr/>
+      </p:nvGrpSpPr>
+      <p:grpSpPr>
+        <a:xfrm>
+          <a:off x="0" y="0"/>
+          <a:ext cx="0" cy="0"/>
+          <a:chOff x="0" y="0"/>
+          <a:chExt cx="0" cy="0"/>
+        </a:xfrm>
+      </p:grpSpPr>
+      <p:sp>
+        <p:nvSpPr>
+          <p:cNvPr id="4" name="Title 1">
+            <a:extLst>
+              <a:ext uri="{FF2B5EF4-FFF2-40B4-BE49-F238E27FC236}">
+                <a16:creationId xmlns:a16="http://schemas.microsoft.com/office/drawing/2014/main" id="{777A71B2-0A48-9F7E-DDDC-A71172EF1645}"/>
+              </a:ext>
+            </a:extLst>
+          </p:cNvPr>
+          <p:cNvSpPr>
+            <a:spLocks noGrp="1"/>
+          </p:cNvSpPr>
+          <p:nvPr>
+            <p:ph type="title"/>
+          </p:nvPr>
+        </p:nvSpPr>
+        <p:spPr>
+          <a:xfrm>
+            <a:off x="1141412" y="0"/>
+            <a:ext cx="5793643" cy="1251379"/>
+          </a:xfrm>
+        </p:spPr>
+        <p:txBody>
+          <a:bodyPr>
+            <a:normAutofit/>
+          </a:bodyPr>
+          <a:lstStyle/>
+          <a:p>
+            <a:r>
+              <a:rPr lang="en-US" dirty="0">
+                <a:solidFill>
+                  <a:schemeClr val="bg1">
+                    <a:lumMod val="85000"/>
+                    <a:lumOff val="15000"/>
+                  </a:schemeClr>
+                </a:solidFill>
+              </a:rPr>
+              <a:t>Model 2 (Results)</a:t>
+            </a:r>
+          </a:p>
+        </p:txBody>
+      </p:sp>
+      <p:sp>
+        <p:nvSpPr>
+          <p:cNvPr id="5" name="TextBox 4">
+            <a:extLst>
+              <a:ext uri="{FF2B5EF4-FFF2-40B4-BE49-F238E27FC236}">
+                <a16:creationId xmlns:a16="http://schemas.microsoft.com/office/drawing/2014/main" id="{B1CE9E1E-B373-1A89-C7D9-EB77883FA98D}"/>
+              </a:ext>
+            </a:extLst>
+          </p:cNvPr>
+          <p:cNvSpPr txBox="1"/>
+          <p:nvPr/>
+        </p:nvSpPr>
+        <p:spPr>
+          <a:xfrm>
+            <a:off x="1141412" y="1251379"/>
+            <a:ext cx="6887976" cy="461665"/>
+          </a:xfrm>
+          <a:prstGeom prst="rect">
+            <a:avLst/>
+          </a:prstGeom>
+          <a:noFill/>
+        </p:spPr>
+        <p:txBody>
+          <a:bodyPr wrap="none" rtlCol="0">
+            <a:spAutoFit/>
+          </a:bodyPr>
+          <a:lstStyle/>
+          <a:p>
+            <a:r>
+              <a:rPr lang="en-US" sz="2400" dirty="0"/>
+              <a:t>Results of the model given random input images shown</a:t>
+            </a:r>
+          </a:p>
+        </p:txBody>
+      </p:sp>
+      <p:pic>
+        <p:nvPicPr>
+          <p:cNvPr id="6" name="Picture 5">
+            <a:extLst>
+              <a:ext uri="{FF2B5EF4-FFF2-40B4-BE49-F238E27FC236}">
+                <a16:creationId xmlns:a16="http://schemas.microsoft.com/office/drawing/2014/main" id="{23C83E46-7217-77EB-4185-1A89BDC89FAF}"/>
+              </a:ext>
+            </a:extLst>
+          </p:cNvPr>
+          <p:cNvPicPr>
+            <a:picLocks noChangeAspect="1"/>
+          </p:cNvPicPr>
+          <p:nvPr/>
+        </p:nvPicPr>
+        <p:blipFill>
+          <a:blip r:embed="rId2"/>
+          <a:stretch>
+            <a:fillRect/>
+          </a:stretch>
+        </p:blipFill>
+        <p:spPr>
+          <a:xfrm>
+            <a:off x="1141412" y="1888978"/>
+            <a:ext cx="4178300" cy="2184400"/>
+          </a:xfrm>
+          <a:prstGeom prst="rect">
+            <a:avLst/>
+          </a:prstGeom>
+        </p:spPr>
+      </p:pic>
+      <p:pic>
+        <p:nvPicPr>
+          <p:cNvPr id="7" name="Picture 6">
+            <a:extLst>
+              <a:ext uri="{FF2B5EF4-FFF2-40B4-BE49-F238E27FC236}">
+                <a16:creationId xmlns:a16="http://schemas.microsoft.com/office/drawing/2014/main" id="{AD94D751-6AAC-942F-6133-83B80D5532CB}"/>
+              </a:ext>
+            </a:extLst>
+          </p:cNvPr>
+          <p:cNvPicPr>
+            <a:picLocks noChangeAspect="1"/>
+          </p:cNvPicPr>
+          <p:nvPr/>
+        </p:nvPicPr>
+        <p:blipFill>
+          <a:blip r:embed="rId3"/>
+          <a:stretch>
+            <a:fillRect/>
+          </a:stretch>
+        </p:blipFill>
+        <p:spPr>
+          <a:xfrm>
+            <a:off x="6782248" y="1888978"/>
+            <a:ext cx="4178300" cy="2184400"/>
+          </a:xfrm>
+          <a:prstGeom prst="rect">
+            <a:avLst/>
+          </a:prstGeom>
+        </p:spPr>
+      </p:pic>
+      <p:pic>
+        <p:nvPicPr>
+          <p:cNvPr id="8" name="Picture 7">
+            <a:extLst>
+              <a:ext uri="{FF2B5EF4-FFF2-40B4-BE49-F238E27FC236}">
+                <a16:creationId xmlns:a16="http://schemas.microsoft.com/office/drawing/2014/main" id="{A90C2474-2CC2-C94D-3FFF-75DD015797FF}"/>
+              </a:ext>
+            </a:extLst>
+          </p:cNvPr>
+          <p:cNvPicPr>
+            <a:picLocks noChangeAspect="1"/>
+          </p:cNvPicPr>
+          <p:nvPr/>
+        </p:nvPicPr>
+        <p:blipFill>
+          <a:blip r:embed="rId4"/>
+          <a:stretch>
+            <a:fillRect/>
+          </a:stretch>
+        </p:blipFill>
+        <p:spPr>
+          <a:xfrm>
+            <a:off x="1141412" y="4249312"/>
+            <a:ext cx="4178300" cy="2184400"/>
+          </a:xfrm>
+          <a:prstGeom prst="rect">
+            <a:avLst/>
+          </a:prstGeom>
+        </p:spPr>
+      </p:pic>
+      <p:pic>
+        <p:nvPicPr>
+          <p:cNvPr id="9" name="Picture 8">
+            <a:extLst>
+              <a:ext uri="{FF2B5EF4-FFF2-40B4-BE49-F238E27FC236}">
+                <a16:creationId xmlns:a16="http://schemas.microsoft.com/office/drawing/2014/main" id="{3102D866-F25B-182B-588A-2C5E9DFB5777}"/>
+              </a:ext>
+            </a:extLst>
+          </p:cNvPr>
+          <p:cNvPicPr>
+            <a:picLocks noChangeAspect="1"/>
+          </p:cNvPicPr>
+          <p:nvPr/>
+        </p:nvPicPr>
+        <p:blipFill>
+          <a:blip r:embed="rId5"/>
+          <a:stretch>
+            <a:fillRect/>
+          </a:stretch>
+        </p:blipFill>
+        <p:spPr>
+          <a:xfrm>
+            <a:off x="6782248" y="4249312"/>
+            <a:ext cx="4178300" cy="2184400"/>
+          </a:xfrm>
+          <a:prstGeom prst="rect">
+            <a:avLst/>
+          </a:prstGeom>
+        </p:spPr>
+      </p:pic>
+    </p:spTree>
+    <p:extLst>
+      <p:ext uri="{BB962C8B-B14F-4D97-AF65-F5344CB8AC3E}">
+        <p14:creationId xmlns:p14="http://schemas.microsoft.com/office/powerpoint/2010/main" val="374419608"/>
+      </p:ext>
+    </p:extLst>
+  </p:cSld>
+  <p:clrMapOvr>
+    <a:masterClrMapping/>
+  </p:clrMapOvr>
+</p:sld>
+</file>
+
+<file path=ppt/slides/slide11.xml><?xml version="1.0" encoding="utf-8"?>
+<p:sld xmlns:a="http://schemas.openxmlformats.org/drawingml/2006/main" xmlns:r="http://schemas.openxmlformats.org/officeDocument/2006/relationships" xmlns:p="http://schemas.openxmlformats.org/presentationml/2006/main">
+  <p:cSld>
+    <p:spTree>
+      <p:nvGrpSpPr>
+        <p:cNvPr id="1" name=""/>
+        <p:cNvGrpSpPr/>
+        <p:nvPr/>
+      </p:nvGrpSpPr>
+      <p:grpSpPr>
+        <a:xfrm>
+          <a:off x="0" y="0"/>
+          <a:ext cx="0" cy="0"/>
+          <a:chOff x="0" y="0"/>
+          <a:chExt cx="0" cy="0"/>
+        </a:xfrm>
+      </p:grpSpPr>
+      <p:sp>
+        <p:nvSpPr>
+          <p:cNvPr id="4" name="Title 1">
+            <a:extLst>
+              <a:ext uri="{FF2B5EF4-FFF2-40B4-BE49-F238E27FC236}">
+                <a16:creationId xmlns:a16="http://schemas.microsoft.com/office/drawing/2014/main" id="{BC66B59E-9A02-0969-3474-3B8E95E6F9D1}"/>
+              </a:ext>
+            </a:extLst>
+          </p:cNvPr>
+          <p:cNvSpPr>
+            <a:spLocks noGrp="1"/>
+          </p:cNvSpPr>
+          <p:nvPr>
+            <p:ph type="title"/>
+          </p:nvPr>
+        </p:nvSpPr>
+        <p:spPr>
+          <a:xfrm>
+            <a:off x="1141412" y="0"/>
+            <a:ext cx="5793643" cy="1251379"/>
+          </a:xfrm>
+        </p:spPr>
+        <p:txBody>
+          <a:bodyPr>
+            <a:normAutofit/>
+          </a:bodyPr>
+          <a:lstStyle/>
+          <a:p>
+            <a:r>
+              <a:rPr lang="en-US" dirty="0">
+                <a:solidFill>
+                  <a:schemeClr val="bg1">
+                    <a:lumMod val="85000"/>
+                    <a:lumOff val="15000"/>
+                  </a:schemeClr>
+                </a:solidFill>
+              </a:rPr>
+              <a:t>Model 3</a:t>
+            </a:r>
+          </a:p>
+        </p:txBody>
+      </p:sp>
+      <p:sp>
+        <p:nvSpPr>
+          <p:cNvPr id="5" name="TextBox 4">
+            <a:extLst>
+              <a:ext uri="{FF2B5EF4-FFF2-40B4-BE49-F238E27FC236}">
+                <a16:creationId xmlns:a16="http://schemas.microsoft.com/office/drawing/2014/main" id="{266F637E-6AF7-9136-BD7D-E83CB96F1A49}"/>
+              </a:ext>
+            </a:extLst>
+          </p:cNvPr>
+          <p:cNvSpPr txBox="1"/>
+          <p:nvPr/>
+        </p:nvSpPr>
+        <p:spPr>
+          <a:xfrm>
+            <a:off x="1141411" y="978453"/>
+            <a:ext cx="6847772" cy="2308324"/>
+          </a:xfrm>
+          <a:prstGeom prst="rect">
+            <a:avLst/>
+          </a:prstGeom>
+          <a:noFill/>
+        </p:spPr>
+        <p:txBody>
+          <a:bodyPr wrap="none" rtlCol="0">
+            <a:spAutoFit/>
+          </a:bodyPr>
+          <a:lstStyle/>
+          <a:p>
+            <a:pPr marL="285750" indent="-285750">
+              <a:buFont typeface="Arial" panose="020B0604020202020204" pitchFamily="34" charset="0"/>
+              <a:buChar char="•"/>
+            </a:pPr>
+            <a:r>
+              <a:rPr lang="en-US" sz="2400" dirty="0"/>
+              <a:t>Implemented using Keras Sequential Model</a:t>
+            </a:r>
+          </a:p>
+          <a:p>
+            <a:pPr marL="285750" indent="-285750">
+              <a:buFont typeface="Arial" panose="020B0604020202020204" pitchFamily="34" charset="0"/>
+              <a:buChar char="•"/>
+            </a:pPr>
+            <a:r>
+              <a:rPr lang="en-US" sz="2400" dirty="0"/>
+              <a:t>2 hidden layers (both </a:t>
+            </a:r>
+            <a:r>
+              <a:rPr lang="en-US" sz="2400" dirty="0" err="1"/>
+              <a:t>relu</a:t>
+            </a:r>
+            <a:r>
+              <a:rPr lang="en-US" sz="2400" dirty="0"/>
+              <a:t>) &amp; output layer SoftMax()</a:t>
+            </a:r>
+          </a:p>
+          <a:p>
+            <a:pPr marL="285750" indent="-285750">
+              <a:buFont typeface="Arial" panose="020B0604020202020204" pitchFamily="34" charset="0"/>
+              <a:buChar char="•"/>
+            </a:pPr>
+            <a:r>
+              <a:rPr lang="en-US" sz="2400" dirty="0"/>
+              <a:t>Optimizer: Adam</a:t>
+            </a:r>
+          </a:p>
+          <a:p>
+            <a:pPr marL="285750" indent="-285750">
+              <a:buFont typeface="Arial" panose="020B0604020202020204" pitchFamily="34" charset="0"/>
+              <a:buChar char="•"/>
+            </a:pPr>
+            <a:r>
+              <a:rPr lang="en-US" sz="2400" dirty="0"/>
+              <a:t>Loss Tracker: </a:t>
+            </a:r>
+            <a:r>
+              <a:rPr lang="en-US" sz="2400" b="0" dirty="0" err="1">
+                <a:effectLst/>
+              </a:rPr>
+              <a:t>sparse_categorical_crossentropy</a:t>
+            </a:r>
+            <a:endParaRPr lang="en-US" sz="2400" b="0" dirty="0">
+              <a:effectLst/>
+            </a:endParaRPr>
+          </a:p>
+          <a:p>
+            <a:pPr marL="285750" indent="-285750">
+              <a:buFont typeface="Arial" panose="020B0604020202020204" pitchFamily="34" charset="0"/>
+              <a:buChar char="•"/>
+            </a:pPr>
+            <a:r>
+              <a:rPr lang="en-US" sz="2400" dirty="0"/>
+              <a:t>Metrics: Accuracy</a:t>
+            </a:r>
+          </a:p>
+          <a:p>
+            <a:pPr marL="285750" indent="-285750">
+              <a:buFont typeface="Arial" panose="020B0604020202020204" pitchFamily="34" charset="0"/>
+              <a:buChar char="•"/>
+            </a:pPr>
+            <a:r>
+              <a:rPr lang="en-US" sz="2400" b="0" dirty="0">
+                <a:effectLst/>
+              </a:rPr>
+              <a:t>Epochs: 20</a:t>
+            </a:r>
+          </a:p>
+        </p:txBody>
+      </p:sp>
+      <p:pic>
+        <p:nvPicPr>
+          <p:cNvPr id="7" name="Picture 6" descr="Text&#10;&#10;Description automatically generated">
+            <a:extLst>
+              <a:ext uri="{FF2B5EF4-FFF2-40B4-BE49-F238E27FC236}">
+                <a16:creationId xmlns:a16="http://schemas.microsoft.com/office/drawing/2014/main" id="{9ABD2E39-8960-CDF8-5A92-823A8B328A23}"/>
+              </a:ext>
+            </a:extLst>
+          </p:cNvPr>
+          <p:cNvPicPr>
+            <a:picLocks noChangeAspect="1"/>
+          </p:cNvPicPr>
+          <p:nvPr/>
+        </p:nvPicPr>
+        <p:blipFill>
+          <a:blip r:embed="rId2"/>
+          <a:stretch>
+            <a:fillRect/>
+          </a:stretch>
+        </p:blipFill>
+        <p:spPr>
+          <a:xfrm>
+            <a:off x="1141411" y="3286777"/>
+            <a:ext cx="7772400" cy="3278571"/>
+          </a:xfrm>
+          <a:prstGeom prst="rect">
+            <a:avLst/>
+          </a:prstGeom>
+        </p:spPr>
+      </p:pic>
+      <p:pic>
+        <p:nvPicPr>
+          <p:cNvPr id="9218" name="Picture 2" descr="ReLU function - AILEPHANT">
+            <a:extLst>
+              <a:ext uri="{FF2B5EF4-FFF2-40B4-BE49-F238E27FC236}">
+                <a16:creationId xmlns:a16="http://schemas.microsoft.com/office/drawing/2014/main" id="{44F98446-6EBE-168B-A5E3-9B77754A7939}"/>
+              </a:ext>
+            </a:extLst>
+          </p:cNvPr>
+          <p:cNvPicPr>
+            <a:picLocks noChangeAspect="1" noChangeArrowheads="1"/>
+          </p:cNvPicPr>
+          <p:nvPr/>
+        </p:nvPicPr>
+        <p:blipFill>
+          <a:blip r:embed="rId3">
+            <a:extLst>
+              <a:ext uri="{28A0092B-C50C-407E-A947-70E740481C1C}">
+                <a14:useLocalDpi xmlns:a14="http://schemas.microsoft.com/office/drawing/2010/main" val="0"/>
+              </a:ext>
+            </a:extLst>
+          </a:blip>
+          <a:srcRect/>
+          <a:stretch>
+            <a:fillRect/>
+          </a:stretch>
+        </p:blipFill>
+        <p:spPr bwMode="auto">
+          <a:xfrm>
+            <a:off x="8913811" y="978453"/>
+            <a:ext cx="2804845" cy="2187779"/>
+          </a:xfrm>
+          <a:prstGeom prst="rect">
+            <a:avLst/>
+          </a:prstGeom>
+          <a:noFill/>
+          <a:extLst>
+            <a:ext uri="{909E8E84-426E-40DD-AFC4-6F175D3DCCD1}">
+              <a14:hiddenFill xmlns:a14="http://schemas.microsoft.com/office/drawing/2010/main">
+                <a:solidFill>
+                  <a:srgbClr val="FFFFFF"/>
+                </a:solidFill>
+              </a14:hiddenFill>
+            </a:ext>
+          </a:extLst>
+        </p:spPr>
+      </p:pic>
+    </p:spTree>
+    <p:extLst>
+      <p:ext uri="{BB962C8B-B14F-4D97-AF65-F5344CB8AC3E}">
+        <p14:creationId xmlns:p14="http://schemas.microsoft.com/office/powerpoint/2010/main" val="2665883973"/>
+      </p:ext>
+    </p:extLst>
+  </p:cSld>
+  <p:clrMapOvr>
+    <a:masterClrMapping/>
+  </p:clrMapOvr>
+</p:sld>
+</file>
+
+<file path=ppt/slides/slide12.xml><?xml version="1.0" encoding="utf-8"?>
+<p:sld xmlns:a="http://schemas.openxmlformats.org/drawingml/2006/main" xmlns:r="http://schemas.openxmlformats.org/officeDocument/2006/relationships" xmlns:p="http://schemas.openxmlformats.org/presentationml/2006/main">
+  <p:cSld>
+    <p:spTree>
+      <p:nvGrpSpPr>
+        <p:cNvPr id="1" name=""/>
+        <p:cNvGrpSpPr/>
+        <p:nvPr/>
+      </p:nvGrpSpPr>
+      <p:grpSpPr>
+        <a:xfrm>
+          <a:off x="0" y="0"/>
+          <a:ext cx="0" cy="0"/>
+          <a:chOff x="0" y="0"/>
+          <a:chExt cx="0" cy="0"/>
+        </a:xfrm>
+      </p:grpSpPr>
+      <p:sp>
+        <p:nvSpPr>
+          <p:cNvPr id="4" name="Title 1">
+            <a:extLst>
+              <a:ext uri="{FF2B5EF4-FFF2-40B4-BE49-F238E27FC236}">
+                <a16:creationId xmlns:a16="http://schemas.microsoft.com/office/drawing/2014/main" id="{C2B25BFA-26D0-C25F-3F3B-3160BEB3D6BD}"/>
+              </a:ext>
+            </a:extLst>
+          </p:cNvPr>
+          <p:cNvSpPr>
+            <a:spLocks noGrp="1"/>
+          </p:cNvSpPr>
+          <p:nvPr>
+            <p:ph type="title"/>
+          </p:nvPr>
+        </p:nvSpPr>
+        <p:spPr>
+          <a:xfrm>
+            <a:off x="1141412" y="0"/>
+            <a:ext cx="5793643" cy="1251379"/>
+          </a:xfrm>
+        </p:spPr>
+        <p:txBody>
+          <a:bodyPr>
+            <a:normAutofit/>
+          </a:bodyPr>
+          <a:lstStyle/>
+          <a:p>
+            <a:r>
+              <a:rPr lang="en-US" dirty="0">
+                <a:solidFill>
+                  <a:schemeClr val="bg1">
+                    <a:lumMod val="85000"/>
+                    <a:lumOff val="15000"/>
+                  </a:schemeClr>
+                </a:solidFill>
+              </a:rPr>
+              <a:t>Model 3 (Runtime &amp; Plots)</a:t>
+            </a:r>
+          </a:p>
+        </p:txBody>
+      </p:sp>
+      <p:pic>
+        <p:nvPicPr>
+          <p:cNvPr id="6" name="Picture 5" descr="Chart, line chart&#10;&#10;Description automatically generated">
+            <a:extLst>
+              <a:ext uri="{FF2B5EF4-FFF2-40B4-BE49-F238E27FC236}">
+                <a16:creationId xmlns:a16="http://schemas.microsoft.com/office/drawing/2014/main" id="{5B6D2386-DEA2-BB59-05E9-BB5C8CBADBA8}"/>
+              </a:ext>
+            </a:extLst>
+          </p:cNvPr>
+          <p:cNvPicPr>
+            <a:picLocks noChangeAspect="1"/>
+          </p:cNvPicPr>
+          <p:nvPr/>
+        </p:nvPicPr>
+        <p:blipFill>
+          <a:blip r:embed="rId2"/>
+          <a:stretch>
+            <a:fillRect/>
+          </a:stretch>
+        </p:blipFill>
+        <p:spPr>
+          <a:xfrm>
+            <a:off x="1141412" y="2100495"/>
+            <a:ext cx="7772400" cy="4035331"/>
+          </a:xfrm>
+          <a:prstGeom prst="rect">
+            <a:avLst/>
+          </a:prstGeom>
+        </p:spPr>
+      </p:pic>
+      <p:sp>
+        <p:nvSpPr>
+          <p:cNvPr id="7" name="TextBox 6">
+            <a:extLst>
+              <a:ext uri="{FF2B5EF4-FFF2-40B4-BE49-F238E27FC236}">
+                <a16:creationId xmlns:a16="http://schemas.microsoft.com/office/drawing/2014/main" id="{1725893D-EF97-E77F-4B96-30A2E3F11614}"/>
+              </a:ext>
+            </a:extLst>
+          </p:cNvPr>
+          <p:cNvSpPr txBox="1"/>
+          <p:nvPr/>
+        </p:nvSpPr>
+        <p:spPr>
+          <a:xfrm>
+            <a:off x="1141412" y="1251379"/>
+            <a:ext cx="8753871" cy="461665"/>
+          </a:xfrm>
+          <a:prstGeom prst="rect">
+            <a:avLst/>
+          </a:prstGeom>
+          <a:noFill/>
+        </p:spPr>
+        <p:txBody>
+          <a:bodyPr wrap="none" rtlCol="0">
+            <a:spAutoFit/>
+          </a:bodyPr>
+          <a:lstStyle/>
+          <a:p>
+            <a:r>
+              <a:rPr lang="en-US" sz="2400" dirty="0"/>
+              <a:t>Time taken to train the model as well as accuracy and loss plots shown</a:t>
+            </a:r>
+          </a:p>
+        </p:txBody>
+      </p:sp>
+    </p:spTree>
+    <p:extLst>
+      <p:ext uri="{BB962C8B-B14F-4D97-AF65-F5344CB8AC3E}">
+        <p14:creationId xmlns:p14="http://schemas.microsoft.com/office/powerpoint/2010/main" val="3266542396"/>
+      </p:ext>
+    </p:extLst>
+  </p:cSld>
+  <p:clrMapOvr>
+    <a:masterClrMapping/>
+  </p:clrMapOvr>
+</p:sld>
+</file>
+
+<file path=ppt/slides/slide13.xml><?xml version="1.0" encoding="utf-8"?>
+<p:sld xmlns:a="http://schemas.openxmlformats.org/drawingml/2006/main" xmlns:r="http://schemas.openxmlformats.org/officeDocument/2006/relationships" xmlns:p="http://schemas.openxmlformats.org/presentationml/2006/main">
+  <p:cSld>
+    <p:spTree>
+      <p:nvGrpSpPr>
+        <p:cNvPr id="1" name=""/>
+        <p:cNvGrpSpPr/>
+        <p:nvPr/>
+      </p:nvGrpSpPr>
+      <p:grpSpPr>
+        <a:xfrm>
+          <a:off x="0" y="0"/>
+          <a:ext cx="0" cy="0"/>
+          <a:chOff x="0" y="0"/>
+          <a:chExt cx="0" cy="0"/>
+        </a:xfrm>
+      </p:grpSpPr>
+      <p:sp>
+        <p:nvSpPr>
+          <p:cNvPr id="4" name="Title 1">
+            <a:extLst>
+              <a:ext uri="{FF2B5EF4-FFF2-40B4-BE49-F238E27FC236}">
+                <a16:creationId xmlns:a16="http://schemas.microsoft.com/office/drawing/2014/main" id="{DE7B59A6-6B0F-FB20-6151-44E17C0E6A67}"/>
+              </a:ext>
+            </a:extLst>
+          </p:cNvPr>
+          <p:cNvSpPr>
+            <a:spLocks noGrp="1"/>
+          </p:cNvSpPr>
+          <p:nvPr>
+            <p:ph type="title"/>
+          </p:nvPr>
+        </p:nvSpPr>
+        <p:spPr>
+          <a:xfrm>
+            <a:off x="1141412" y="0"/>
+            <a:ext cx="5793643" cy="1251379"/>
+          </a:xfrm>
+        </p:spPr>
+        <p:txBody>
+          <a:bodyPr>
+            <a:normAutofit/>
+          </a:bodyPr>
+          <a:lstStyle/>
+          <a:p>
+            <a:r>
+              <a:rPr lang="en-US" dirty="0">
+                <a:solidFill>
+                  <a:schemeClr val="bg1">
+                    <a:lumMod val="85000"/>
+                    <a:lumOff val="15000"/>
+                  </a:schemeClr>
+                </a:solidFill>
+              </a:rPr>
+              <a:t>Model 3 (Results)</a:t>
+            </a:r>
+          </a:p>
+        </p:txBody>
+      </p:sp>
+      <p:pic>
+        <p:nvPicPr>
+          <p:cNvPr id="5" name="Picture 4">
+            <a:extLst>
+              <a:ext uri="{FF2B5EF4-FFF2-40B4-BE49-F238E27FC236}">
+                <a16:creationId xmlns:a16="http://schemas.microsoft.com/office/drawing/2014/main" id="{3A7EF56B-F4A8-6F6C-2F06-5F7FA09DA0BA}"/>
+              </a:ext>
+            </a:extLst>
+          </p:cNvPr>
+          <p:cNvPicPr>
+            <a:picLocks noChangeAspect="1"/>
+          </p:cNvPicPr>
+          <p:nvPr/>
+        </p:nvPicPr>
+        <p:blipFill>
+          <a:blip r:embed="rId2"/>
+          <a:stretch>
+            <a:fillRect/>
+          </a:stretch>
+        </p:blipFill>
+        <p:spPr>
+          <a:xfrm>
+            <a:off x="1141412" y="1914736"/>
+            <a:ext cx="4178300" cy="2184400"/>
+          </a:xfrm>
+          <a:prstGeom prst="rect">
+            <a:avLst/>
+          </a:prstGeom>
+        </p:spPr>
+      </p:pic>
+      <p:pic>
+        <p:nvPicPr>
+          <p:cNvPr id="6" name="Picture 5">
+            <a:extLst>
+              <a:ext uri="{FF2B5EF4-FFF2-40B4-BE49-F238E27FC236}">
+                <a16:creationId xmlns:a16="http://schemas.microsoft.com/office/drawing/2014/main" id="{36216E35-53E1-20CD-5755-7BEA4D37D6FE}"/>
+              </a:ext>
+            </a:extLst>
+          </p:cNvPr>
+          <p:cNvPicPr>
+            <a:picLocks noChangeAspect="1"/>
+          </p:cNvPicPr>
+          <p:nvPr/>
+        </p:nvPicPr>
+        <p:blipFill>
+          <a:blip r:embed="rId3"/>
+          <a:stretch>
+            <a:fillRect/>
+          </a:stretch>
+        </p:blipFill>
+        <p:spPr>
+          <a:xfrm>
+            <a:off x="6834278" y="1914736"/>
+            <a:ext cx="4178300" cy="2184400"/>
+          </a:xfrm>
+          <a:prstGeom prst="rect">
+            <a:avLst/>
+          </a:prstGeom>
+        </p:spPr>
+      </p:pic>
+      <p:pic>
+        <p:nvPicPr>
+          <p:cNvPr id="7" name="Picture 6">
+            <a:extLst>
+              <a:ext uri="{FF2B5EF4-FFF2-40B4-BE49-F238E27FC236}">
+                <a16:creationId xmlns:a16="http://schemas.microsoft.com/office/drawing/2014/main" id="{F2839244-70DA-7BB3-4EBC-B1DBB5539255}"/>
+              </a:ext>
+            </a:extLst>
+          </p:cNvPr>
+          <p:cNvPicPr>
+            <a:picLocks noChangeAspect="1"/>
+          </p:cNvPicPr>
+          <p:nvPr/>
+        </p:nvPicPr>
+        <p:blipFill>
+          <a:blip r:embed="rId4"/>
+          <a:stretch>
+            <a:fillRect/>
+          </a:stretch>
+        </p:blipFill>
+        <p:spPr>
+          <a:xfrm>
+            <a:off x="1141412" y="4300828"/>
+            <a:ext cx="4178300" cy="2184400"/>
+          </a:xfrm>
+          <a:prstGeom prst="rect">
+            <a:avLst/>
+          </a:prstGeom>
+        </p:spPr>
+      </p:pic>
+      <p:pic>
+        <p:nvPicPr>
+          <p:cNvPr id="8" name="Picture 7">
+            <a:extLst>
+              <a:ext uri="{FF2B5EF4-FFF2-40B4-BE49-F238E27FC236}">
+                <a16:creationId xmlns:a16="http://schemas.microsoft.com/office/drawing/2014/main" id="{8377930B-D75C-AE80-08DE-99C1C2D96311}"/>
+              </a:ext>
+            </a:extLst>
+          </p:cNvPr>
+          <p:cNvPicPr>
+            <a:picLocks noChangeAspect="1"/>
+          </p:cNvPicPr>
+          <p:nvPr/>
+        </p:nvPicPr>
+        <p:blipFill>
+          <a:blip r:embed="rId5"/>
+          <a:stretch>
+            <a:fillRect/>
+          </a:stretch>
+        </p:blipFill>
+        <p:spPr>
+          <a:xfrm>
+            <a:off x="6834277" y="4300828"/>
+            <a:ext cx="4178300" cy="2184400"/>
+          </a:xfrm>
+          <a:prstGeom prst="rect">
+            <a:avLst/>
+          </a:prstGeom>
+        </p:spPr>
+      </p:pic>
+      <p:sp>
+        <p:nvSpPr>
+          <p:cNvPr id="9" name="TextBox 8">
+            <a:extLst>
+              <a:ext uri="{FF2B5EF4-FFF2-40B4-BE49-F238E27FC236}">
+                <a16:creationId xmlns:a16="http://schemas.microsoft.com/office/drawing/2014/main" id="{D3E68FE8-91C9-86DC-215C-60C27D2515B8}"/>
+              </a:ext>
+            </a:extLst>
+          </p:cNvPr>
+          <p:cNvSpPr txBox="1"/>
+          <p:nvPr/>
+        </p:nvSpPr>
+        <p:spPr>
+          <a:xfrm>
+            <a:off x="1141412" y="1251379"/>
+            <a:ext cx="6887976" cy="461665"/>
+          </a:xfrm>
+          <a:prstGeom prst="rect">
+            <a:avLst/>
+          </a:prstGeom>
+          <a:noFill/>
+        </p:spPr>
+        <p:txBody>
+          <a:bodyPr wrap="none" rtlCol="0">
+            <a:spAutoFit/>
+          </a:bodyPr>
+          <a:lstStyle/>
+          <a:p>
+            <a:r>
+              <a:rPr lang="en-US" sz="2400" dirty="0"/>
+              <a:t>Results of the model given random input images shown</a:t>
+            </a:r>
+          </a:p>
+        </p:txBody>
+      </p:sp>
+    </p:spTree>
+    <p:extLst>
+      <p:ext uri="{BB962C8B-B14F-4D97-AF65-F5344CB8AC3E}">
+        <p14:creationId xmlns:p14="http://schemas.microsoft.com/office/powerpoint/2010/main" val="1868924164"/>
+      </p:ext>
+    </p:extLst>
+  </p:cSld>
+  <p:clrMapOvr>
+    <a:masterClrMapping/>
+  </p:clrMapOvr>
+</p:sld>
+</file>
+
 <file path=ppt/slides/slide2.xml><?xml version="1.0" encoding="utf-8"?>
 <p:sld xmlns:a="http://schemas.openxmlformats.org/drawingml/2006/main" xmlns:r="http://schemas.openxmlformats.org/officeDocument/2006/relationships" xmlns:p="http://schemas.openxmlformats.org/presentationml/2006/main">
   <p:cSld>
@@ -12597,7 +13454,27 @@
                   </a:schemeClr>
                 </a:solidFill>
               </a:rPr>
-              <a:t> dataset from Sklearn</a:t>
+              <a:t> dataset from Sklearn and </a:t>
+            </a:r>
+            <a:r>
+              <a:rPr lang="en-US" dirty="0" err="1">
+                <a:solidFill>
+                  <a:schemeClr val="tx1">
+                    <a:lumMod val="85000"/>
+                  </a:schemeClr>
+                </a:solidFill>
+              </a:rPr>
+              <a:t>train_test_split</a:t>
+            </a:r>
+            <a:r>
+              <a:rPr lang="en-US" dirty="0">
+                <a:solidFill>
+                  <a:schemeClr val="tx1">
+                    <a:lumMod val="85000"/>
+                  </a:schemeClr>
+                </a:solidFill>
+              </a:rPr>
+              <a:t> function</a:t>
             </a:r>
           </a:p>
           <a:p>
@@ -12956,6 +13833,324 @@
         <p:spPr>
           <a:xfrm>
             <a:off x="1141412" y="0"/>
+            <a:ext cx="7283397" cy="1251379"/>
+          </a:xfrm>
+        </p:spPr>
+        <p:txBody>
+          <a:bodyPr>
+            <a:normAutofit/>
+          </a:bodyPr>
+          <a:lstStyle/>
+          <a:p>
+            <a:r>
+              <a:rPr lang="en-US" dirty="0">
+                <a:solidFill>
+                  <a:schemeClr val="bg1">
+                    <a:lumMod val="85000"/>
+                    <a:lumOff val="15000"/>
+                  </a:schemeClr>
+                </a:solidFill>
+              </a:rPr>
+              <a:t>Background (Neural Networks)</a:t>
+            </a:r>
+          </a:p>
+        </p:txBody>
+      </p:sp>
+      <p:sp>
+        <p:nvSpPr>
+          <p:cNvPr id="5" name="TextBox 4">
+            <a:extLst>
+              <a:ext uri="{FF2B5EF4-FFF2-40B4-BE49-F238E27FC236}">
+                <a16:creationId xmlns:a16="http://schemas.microsoft.com/office/drawing/2014/main" id="{2D4FF995-9907-F040-7B09-F06BD1611858}"/>
+              </a:ext>
+            </a:extLst>
+          </p:cNvPr>
+          <p:cNvSpPr txBox="1"/>
+          <p:nvPr/>
+        </p:nvSpPr>
+        <p:spPr>
+          <a:xfrm>
+            <a:off x="1141412" y="1109610"/>
+            <a:ext cx="10613203" cy="707886"/>
+          </a:xfrm>
+          <a:prstGeom prst="rect">
+            <a:avLst/>
+          </a:prstGeom>
+          <a:noFill/>
+        </p:spPr>
+        <p:txBody>
+          <a:bodyPr wrap="square" rtlCol="0">
+            <a:spAutoFit/>
+          </a:bodyPr>
+          <a:lstStyle/>
+          <a:p>
+            <a:r>
+              <a:rPr lang="en-US" sz="2000" u="sng" dirty="0"/>
+              <a:t>Definition</a:t>
+            </a:r>
+            <a:r>
+              <a:rPr lang="en-US" sz="2000" dirty="0"/>
+              <a:t>: Neural Networks (NNs) are AI models that receive input data, perform operations on that data, and process the outputs</a:t>
+            </a:r>
+          </a:p>
+        </p:txBody>
+      </p:sp>
+      <p:sp>
+        <p:nvSpPr>
+          <p:cNvPr id="6" name="TextBox 5">
+            <a:extLst>
+              <a:ext uri="{FF2B5EF4-FFF2-40B4-BE49-F238E27FC236}">
+                <a16:creationId xmlns:a16="http://schemas.microsoft.com/office/drawing/2014/main" id="{3EB46D4F-907D-CB2F-64F7-76416D5FF0FB}"/>
+              </a:ext>
+            </a:extLst>
+          </p:cNvPr>
+          <p:cNvSpPr txBox="1"/>
+          <p:nvPr/>
+        </p:nvSpPr>
+        <p:spPr>
+          <a:xfrm>
+            <a:off x="1141412" y="1828562"/>
+            <a:ext cx="9553986" cy="1908215"/>
+          </a:xfrm>
+          <a:prstGeom prst="rect">
+            <a:avLst/>
+          </a:prstGeom>
+          <a:noFill/>
+        </p:spPr>
+        <p:txBody>
+          <a:bodyPr wrap="square" rtlCol="0">
+            <a:spAutoFit/>
+          </a:bodyPr>
+          <a:lstStyle/>
+          <a:p>
+            <a:pPr marL="285750" indent="-285750">
+              <a:buFont typeface="Arial" panose="020B0604020202020204" pitchFamily="34" charset="0"/>
+              <a:buChar char="•"/>
+            </a:pPr>
+            <a:r>
+              <a:rPr lang="en-US" sz="2000" dirty="0">
+                <a:solidFill>
+                  <a:schemeClr val="tx1">
+                    <a:lumMod val="85000"/>
+                  </a:schemeClr>
+                </a:solidFill>
+              </a:rPr>
+              <a:t>NNs consists of an input layer, one or more hidden layers, and an output layer </a:t>
+            </a:r>
+          </a:p>
+          <a:p>
+            <a:pPr marL="285750" indent="-285750">
+              <a:buFont typeface="Arial" panose="020B0604020202020204" pitchFamily="34" charset="0"/>
+              <a:buChar char="•"/>
+            </a:pPr>
+            <a:r>
+              <a:rPr lang="en-US" sz="2000" dirty="0">
+                <a:solidFill>
+                  <a:schemeClr val="tx1">
+                    <a:lumMod val="85000"/>
+                  </a:schemeClr>
+                </a:solidFill>
+              </a:rPr>
+              <a:t>Each of the models made can be labeled as a Multi Layer Perceptron (MLP)</a:t>
+            </a:r>
+          </a:p>
+          <a:p>
+            <a:r>
+              <a:rPr lang="en-US" sz="2000" dirty="0">
+                <a:solidFill>
+                  <a:schemeClr val="tx1">
+                    <a:lumMod val="85000"/>
+                  </a:schemeClr>
+                </a:solidFill>
+              </a:rPr>
+              <a:t>Input Layer: Receives data and passes to hidden layer(s) for processing</a:t>
+            </a:r>
+          </a:p>
+          <a:p>
+            <a:r>
+              <a:rPr lang="en-US" sz="2000" dirty="0">
+                <a:solidFill>
+                  <a:schemeClr val="tx1">
+                    <a:lumMod val="85000"/>
+                  </a:schemeClr>
+                </a:solidFill>
+              </a:rPr>
+              <a:t>Hidden Layer: Input data undergoes operations (ran through activation function)</a:t>
+            </a:r>
+          </a:p>
+          <a:p>
+            <a:r>
+              <a:rPr lang="en-US" sz="2000" dirty="0">
+                <a:solidFill>
+                  <a:schemeClr val="tx1">
+                    <a:lumMod val="85000"/>
+                  </a:schemeClr>
+                </a:solidFill>
+              </a:rPr>
+              <a:t>Output Layer: Produces a classification for an image and is tested using a validation set </a:t>
+            </a:r>
+          </a:p>
+          <a:p>
+            <a:endParaRPr lang="en-US" dirty="0"/>
+          </a:p>
+        </p:txBody>
+      </p:sp>
+      <p:pic>
+        <p:nvPicPr>
+          <p:cNvPr id="2050" name="Picture 2">
+            <a:extLst>
+              <a:ext uri="{FF2B5EF4-FFF2-40B4-BE49-F238E27FC236}">
+                <a16:creationId xmlns:a16="http://schemas.microsoft.com/office/drawing/2014/main" id="{52594246-C625-F353-C047-D58738B21045}"/>
+              </a:ext>
+            </a:extLst>
+          </p:cNvPr>
+          <p:cNvPicPr>
+            <a:picLocks noChangeAspect="1" noChangeArrowheads="1"/>
+          </p:cNvPicPr>
+          <p:nvPr/>
+        </p:nvPicPr>
+        <p:blipFill>
+          <a:blip r:embed="rId2">
+            <a:extLst>
+              <a:ext uri="{28A0092B-C50C-407E-A947-70E740481C1C}">
+                <a14:useLocalDpi xmlns:a14="http://schemas.microsoft.com/office/drawing/2010/main" val="0"/>
+              </a:ext>
+            </a:extLst>
+          </a:blip>
+          <a:srcRect/>
+          <a:stretch>
+            <a:fillRect/>
+          </a:stretch>
+        </p:blipFill>
+        <p:spPr bwMode="auto">
+          <a:xfrm>
+            <a:off x="3777679" y="3766428"/>
+            <a:ext cx="4636642" cy="3091572"/>
+          </a:xfrm>
+          <a:prstGeom prst="rect">
+            <a:avLst/>
+          </a:prstGeom>
+          <a:noFill/>
+          <a:extLst>
+            <a:ext uri="{909E8E84-426E-40DD-AFC4-6F175D3DCCD1}">
+              <a14:hiddenFill xmlns:a14="http://schemas.microsoft.com/office/drawing/2010/main">
+                <a:solidFill>
+                  <a:srgbClr val="FFFFFF"/>
+                </a:solidFill>
+              </a14:hiddenFill>
+            </a:ext>
+          </a:extLst>
+        </p:spPr>
+      </p:pic>
+      <p:pic>
+        <p:nvPicPr>
+          <p:cNvPr id="8" name="Picture 7" descr="Qr code&#10;&#10;Description automatically generated with low confidence">
+            <a:extLst>
+              <a:ext uri="{FF2B5EF4-FFF2-40B4-BE49-F238E27FC236}">
+                <a16:creationId xmlns:a16="http://schemas.microsoft.com/office/drawing/2014/main" id="{3F606444-7D64-0742-3D11-3F88A5BC20A2}"/>
+              </a:ext>
+            </a:extLst>
+          </p:cNvPr>
+          <p:cNvPicPr>
+            <a:picLocks noChangeAspect="1"/>
+          </p:cNvPicPr>
+          <p:nvPr/>
+        </p:nvPicPr>
+        <p:blipFill>
+          <a:blip r:embed="rId3"/>
+          <a:stretch>
+            <a:fillRect/>
+          </a:stretch>
+        </p:blipFill>
+        <p:spPr>
+          <a:xfrm>
+            <a:off x="1141412" y="3885153"/>
+            <a:ext cx="2310704" cy="2310704"/>
+          </a:xfrm>
+          <a:prstGeom prst="rect">
+            <a:avLst/>
+          </a:prstGeom>
+        </p:spPr>
+      </p:pic>
+      <p:pic>
+        <p:nvPicPr>
+          <p:cNvPr id="10" name="Picture 9" descr="Shape&#10;&#10;Description automatically generated">
+            <a:extLst>
+              <a:ext uri="{FF2B5EF4-FFF2-40B4-BE49-F238E27FC236}">
+                <a16:creationId xmlns:a16="http://schemas.microsoft.com/office/drawing/2014/main" id="{87892A2C-A50E-74CB-1358-AC574E6CE6B0}"/>
+              </a:ext>
+            </a:extLst>
+          </p:cNvPr>
+          <p:cNvPicPr>
+            <a:picLocks noChangeAspect="1"/>
+          </p:cNvPicPr>
+          <p:nvPr/>
+        </p:nvPicPr>
+        <p:blipFill>
+          <a:blip r:embed="rId4"/>
+          <a:stretch>
+            <a:fillRect/>
+          </a:stretch>
+        </p:blipFill>
+        <p:spPr>
+          <a:xfrm>
+            <a:off x="8739884" y="3885153"/>
+            <a:ext cx="749300" cy="2310704"/>
+          </a:xfrm>
+          <a:prstGeom prst="rect">
+            <a:avLst/>
+          </a:prstGeom>
+        </p:spPr>
+      </p:pic>
+    </p:spTree>
+    <p:extLst>
+      <p:ext uri="{BB962C8B-B14F-4D97-AF65-F5344CB8AC3E}">
+        <p14:creationId xmlns:p14="http://schemas.microsoft.com/office/powerpoint/2010/main" val="3615362307"/>
+      </p:ext>
+    </p:extLst>
+  </p:cSld>
+  <p:clrMapOvr>
+    <a:masterClrMapping/>
+  </p:clrMapOvr>
+</p:sld>
+</file>
+
+<file path=ppt/slides/slide5.xml><?xml version="1.0" encoding="utf-8"?>
+<p:sld xmlns:a="http://schemas.openxmlformats.org/drawingml/2006/main" xmlns:r="http://schemas.openxmlformats.org/officeDocument/2006/relationships" xmlns:p="http://schemas.openxmlformats.org/presentationml/2006/main">
+  <p:cSld>
+    <p:spTree>
+      <p:nvGrpSpPr>
+        <p:cNvPr id="1" name=""/>
+        <p:cNvGrpSpPr/>
+        <p:nvPr/>
+      </p:nvGrpSpPr>
+      <p:grpSpPr>
+        <a:xfrm>
+          <a:off x="0" y="0"/>
+          <a:ext cx="0" cy="0"/>
+          <a:chOff x="0" y="0"/>
+          <a:chExt cx="0" cy="0"/>
+        </a:xfrm>
+      </p:grpSpPr>
+      <p:sp>
+        <p:nvSpPr>
+          <p:cNvPr id="4" name="Title 1">
+            <a:extLst>
+              <a:ext uri="{FF2B5EF4-FFF2-40B4-BE49-F238E27FC236}">
+                <a16:creationId xmlns:a16="http://schemas.microsoft.com/office/drawing/2014/main" id="{7DDEA92D-6358-A81A-70CD-1C4FF6E333E1}"/>
+              </a:ext>
+            </a:extLst>
+          </p:cNvPr>
+          <p:cNvSpPr>
+            <a:spLocks noGrp="1"/>
+          </p:cNvSpPr>
+          <p:nvPr>
+            <p:ph type="title"/>
+          </p:nvPr>
+        </p:nvSpPr>
+        <p:spPr>
+          <a:xfrm>
+            <a:off x="1141412" y="0"/>
             <a:ext cx="5793643" cy="1251379"/>
           </a:xfrm>
         </p:spPr>
@@ -12974,7 +14169,210 @@
                   </a:schemeClr>
                 </a:solidFill>
               </a:rPr>
-              <a:t>Background (Image Data)</a:t>
+              <a:t>Model 1</a:t>
+            </a:r>
+          </a:p>
+        </p:txBody>
+      </p:sp>
+      <p:sp>
+        <p:nvSpPr>
+          <p:cNvPr id="5" name="TextBox 4">
+            <a:extLst>
+              <a:ext uri="{FF2B5EF4-FFF2-40B4-BE49-F238E27FC236}">
+                <a16:creationId xmlns:a16="http://schemas.microsoft.com/office/drawing/2014/main" id="{580DD776-5C52-37BD-B433-D3F8B9D9BD15}"/>
+              </a:ext>
+            </a:extLst>
+          </p:cNvPr>
+          <p:cNvSpPr txBox="1"/>
+          <p:nvPr/>
+        </p:nvSpPr>
+        <p:spPr>
+          <a:xfrm>
+            <a:off x="1141412" y="1251379"/>
+            <a:ext cx="6012095" cy="1938992"/>
+          </a:xfrm>
+          <a:prstGeom prst="rect">
+            <a:avLst/>
+          </a:prstGeom>
+          <a:noFill/>
+        </p:spPr>
+        <p:txBody>
+          <a:bodyPr wrap="none" rtlCol="0">
+            <a:spAutoFit/>
+          </a:bodyPr>
+          <a:lstStyle/>
+          <a:p>
+            <a:pPr marL="285750" indent="-285750">
+              <a:buFont typeface="Arial" panose="020B0604020202020204" pitchFamily="34" charset="0"/>
+              <a:buChar char="•"/>
+            </a:pPr>
+            <a:r>
+              <a:rPr lang="en-US" sz="2400" dirty="0"/>
+              <a:t>Implemented using 1 hidden &amp; 1 output layer</a:t>
+            </a:r>
+          </a:p>
+          <a:p>
+            <a:pPr marL="285750" indent="-285750">
+              <a:buFont typeface="Arial" panose="020B0604020202020204" pitchFamily="34" charset="0"/>
+              <a:buChar char="•"/>
+            </a:pPr>
+            <a:r>
+              <a:rPr lang="en-US" sz="2400" dirty="0"/>
+              <a:t>Hidden Layer: tanh() </a:t>
+            </a:r>
+          </a:p>
+          <a:p>
+            <a:pPr marL="285750" indent="-285750">
+              <a:buFont typeface="Arial" panose="020B0604020202020204" pitchFamily="34" charset="0"/>
+              <a:buChar char="•"/>
+            </a:pPr>
+            <a:r>
+              <a:rPr lang="en-US" sz="2400" dirty="0"/>
+              <a:t>Output layer: derivative of tanh()</a:t>
+            </a:r>
+          </a:p>
+          <a:p>
+            <a:pPr marL="285750" indent="-285750">
+              <a:buFont typeface="Arial" panose="020B0604020202020204" pitchFamily="34" charset="0"/>
+              <a:buChar char="•"/>
+            </a:pPr>
+            <a:r>
+              <a:rPr lang="en-US" sz="2400" dirty="0"/>
+              <a:t>1000 epochs</a:t>
+            </a:r>
+          </a:p>
+          <a:p>
+            <a:pPr marL="285750" indent="-285750">
+              <a:buFont typeface="Arial" panose="020B0604020202020204" pitchFamily="34" charset="0"/>
+              <a:buChar char="•"/>
+            </a:pPr>
+            <a:r>
+              <a:rPr lang="en-US" sz="2400" dirty="0"/>
+              <a:t>0.1 learning rate </a:t>
+            </a:r>
+          </a:p>
+        </p:txBody>
+      </p:sp>
+      <p:pic>
+        <p:nvPicPr>
+          <p:cNvPr id="3074" name="Picture 2" descr="Activation Functions with Derivative and Python code: Sigmoid vs Tanh Vs  Relu | by Nallagoni Omkar | Medium">
+            <a:extLst>
+              <a:ext uri="{FF2B5EF4-FFF2-40B4-BE49-F238E27FC236}">
+                <a16:creationId xmlns:a16="http://schemas.microsoft.com/office/drawing/2014/main" id="{B11D00EC-2123-04A7-42D1-8F083663D7B9}"/>
+              </a:ext>
+            </a:extLst>
+          </p:cNvPr>
+          <p:cNvPicPr>
+            <a:picLocks noChangeAspect="1" noChangeArrowheads="1"/>
+          </p:cNvPicPr>
+          <p:nvPr/>
+        </p:nvPicPr>
+        <p:blipFill>
+          <a:blip r:embed="rId2">
+            <a:extLst>
+              <a:ext uri="{28A0092B-C50C-407E-A947-70E740481C1C}">
+                <a14:useLocalDpi xmlns:a14="http://schemas.microsoft.com/office/drawing/2010/main" val="0"/>
+              </a:ext>
+            </a:extLst>
+          </a:blip>
+          <a:srcRect/>
+          <a:stretch>
+            <a:fillRect/>
+          </a:stretch>
+        </p:blipFill>
+        <p:spPr bwMode="auto">
+          <a:xfrm>
+            <a:off x="1278276" y="3667630"/>
+            <a:ext cx="4817724" cy="2676513"/>
+          </a:xfrm>
+          <a:prstGeom prst="rect">
+            <a:avLst/>
+          </a:prstGeom>
+          <a:noFill/>
+          <a:extLst>
+            <a:ext uri="{909E8E84-426E-40DD-AFC4-6F175D3DCCD1}">
+              <a14:hiddenFill xmlns:a14="http://schemas.microsoft.com/office/drawing/2010/main">
+                <a:solidFill>
+                  <a:srgbClr val="FFFFFF"/>
+                </a:solidFill>
+              </a14:hiddenFill>
+            </a:ext>
+          </a:extLst>
+        </p:spPr>
+      </p:pic>
+      <p:sp>
+        <p:nvSpPr>
+          <p:cNvPr id="6" name="TextBox 5">
+            <a:extLst>
+              <a:ext uri="{FF2B5EF4-FFF2-40B4-BE49-F238E27FC236}">
+                <a16:creationId xmlns:a16="http://schemas.microsoft.com/office/drawing/2014/main" id="{34462A7D-0979-DCE5-5B01-76D0262296C3}"/>
+              </a:ext>
+            </a:extLst>
+          </p:cNvPr>
+          <p:cNvSpPr txBox="1"/>
+          <p:nvPr/>
+        </p:nvSpPr>
+        <p:spPr>
+          <a:xfrm>
+            <a:off x="6339156" y="3667630"/>
+            <a:ext cx="5755358" cy="2308324"/>
+          </a:xfrm>
+          <a:prstGeom prst="rect">
+            <a:avLst/>
+          </a:prstGeom>
+          <a:noFill/>
+        </p:spPr>
+        <p:txBody>
+          <a:bodyPr wrap="none" rtlCol="0">
+            <a:spAutoFit/>
+          </a:bodyPr>
+          <a:lstStyle/>
+          <a:p>
+            <a:r>
+              <a:rPr lang="en-US" sz="2400" dirty="0"/>
+              <a:t>Plots for activation functions</a:t>
+            </a:r>
+          </a:p>
+          <a:p>
+            <a:r>
+              <a:rPr lang="en-US" sz="2400" dirty="0"/>
+              <a:t>Tanh and its derivative used due following:</a:t>
+            </a:r>
+          </a:p>
+          <a:p>
+            <a:pPr marL="285750" indent="-285750">
+              <a:buFont typeface="Arial" panose="020B0604020202020204" pitchFamily="34" charset="0"/>
+              <a:buChar char="•"/>
+            </a:pPr>
+            <a:r>
+              <a:rPr lang="en-US" sz="2400" dirty="0"/>
+              <a:t>Non-linearity</a:t>
+            </a:r>
+          </a:p>
+          <a:p>
+            <a:pPr marL="285750" indent="-285750">
+              <a:buFont typeface="Arial" panose="020B0604020202020204" pitchFamily="34" charset="0"/>
+              <a:buChar char="•"/>
+            </a:pPr>
+            <a:r>
+              <a:rPr lang="en-US" sz="2400" dirty="0"/>
+              <a:t>Centered around 0</a:t>
+            </a:r>
+          </a:p>
+          <a:p>
+            <a:pPr marL="285750" indent="-285750">
+              <a:buFont typeface="Arial" panose="020B0604020202020204" pitchFamily="34" charset="0"/>
+              <a:buChar char="•"/>
+            </a:pPr>
+            <a:r>
+              <a:rPr lang="en-US" sz="2400" dirty="0"/>
+              <a:t>Smooth curves</a:t>
+            </a:r>
+          </a:p>
+          <a:p>
+            <a:r>
+              <a:rPr lang="en-US" sz="2400" dirty="0"/>
+              <a:t>All reasons make it easier for the NN to learn</a:t>
             </a:r>
           </a:p>
         </p:txBody>
@@ -12982,7 +14380,779 @@
     </p:spTree>
     <p:extLst>
       <p:ext uri="{BB962C8B-B14F-4D97-AF65-F5344CB8AC3E}">
-        <p14:creationId xmlns:p14="http://schemas.microsoft.com/office/powerpoint/2010/main" val="3615362307"/>
+        <p14:creationId xmlns:p14="http://schemas.microsoft.com/office/powerpoint/2010/main" val="27133385"/>
+      </p:ext>
+    </p:extLst>
+  </p:cSld>
+  <p:clrMapOvr>
+    <a:masterClrMapping/>
+  </p:clrMapOvr>
+</p:sld>
+</file>
+
+<file path=ppt/slides/slide6.xml><?xml version="1.0" encoding="utf-8"?>
+<p:sld xmlns:a="http://schemas.openxmlformats.org/drawingml/2006/main" xmlns:r="http://schemas.openxmlformats.org/officeDocument/2006/relationships" xmlns:p="http://schemas.openxmlformats.org/presentationml/2006/main">
+  <p:cSld>
+    <p:spTree>
+      <p:nvGrpSpPr>
+        <p:cNvPr id="1" name=""/>
+        <p:cNvGrpSpPr/>
+        <p:nvPr/>
+      </p:nvGrpSpPr>
+      <p:grpSpPr>
+        <a:xfrm>
+          <a:off x="0" y="0"/>
+          <a:ext cx="0" cy="0"/>
+          <a:chOff x="0" y="0"/>
+          <a:chExt cx="0" cy="0"/>
+        </a:xfrm>
+      </p:grpSpPr>
+      <p:sp>
+        <p:nvSpPr>
+          <p:cNvPr id="4" name="Title 1">
+            <a:extLst>
+              <a:ext uri="{FF2B5EF4-FFF2-40B4-BE49-F238E27FC236}">
+                <a16:creationId xmlns:a16="http://schemas.microsoft.com/office/drawing/2014/main" id="{45857496-8A8D-12A4-D7FE-8A3AD97AC413}"/>
+              </a:ext>
+            </a:extLst>
+          </p:cNvPr>
+          <p:cNvSpPr>
+            <a:spLocks noGrp="1"/>
+          </p:cNvSpPr>
+          <p:nvPr>
+            <p:ph type="title"/>
+          </p:nvPr>
+        </p:nvSpPr>
+        <p:spPr>
+          <a:xfrm>
+            <a:off x="1141412" y="0"/>
+            <a:ext cx="5793643" cy="1251379"/>
+          </a:xfrm>
+        </p:spPr>
+        <p:txBody>
+          <a:bodyPr>
+            <a:normAutofit/>
+          </a:bodyPr>
+          <a:lstStyle/>
+          <a:p>
+            <a:r>
+              <a:rPr lang="en-US" dirty="0">
+                <a:solidFill>
+                  <a:schemeClr val="bg1">
+                    <a:lumMod val="85000"/>
+                    <a:lumOff val="15000"/>
+                  </a:schemeClr>
+                </a:solidFill>
+              </a:rPr>
+              <a:t>Model 1 (Runtime &amp; Plots)</a:t>
+            </a:r>
+          </a:p>
+        </p:txBody>
+      </p:sp>
+      <p:sp>
+        <p:nvSpPr>
+          <p:cNvPr id="5" name="TextBox 4">
+            <a:extLst>
+              <a:ext uri="{FF2B5EF4-FFF2-40B4-BE49-F238E27FC236}">
+                <a16:creationId xmlns:a16="http://schemas.microsoft.com/office/drawing/2014/main" id="{B16589F4-ADB1-8B6C-DE0D-C25FD3404857}"/>
+              </a:ext>
+            </a:extLst>
+          </p:cNvPr>
+          <p:cNvSpPr txBox="1"/>
+          <p:nvPr/>
+        </p:nvSpPr>
+        <p:spPr>
+          <a:xfrm>
+            <a:off x="1141412" y="1251379"/>
+            <a:ext cx="8753871" cy="461665"/>
+          </a:xfrm>
+          <a:prstGeom prst="rect">
+            <a:avLst/>
+          </a:prstGeom>
+          <a:noFill/>
+        </p:spPr>
+        <p:txBody>
+          <a:bodyPr wrap="none" rtlCol="0">
+            <a:spAutoFit/>
+          </a:bodyPr>
+          <a:lstStyle/>
+          <a:p>
+            <a:r>
+              <a:rPr lang="en-US" sz="2400" dirty="0"/>
+              <a:t>Time taken to train the model as well as accuracy and loss plots shown</a:t>
+            </a:r>
+          </a:p>
+        </p:txBody>
+      </p:sp>
+      <p:pic>
+        <p:nvPicPr>
+          <p:cNvPr id="7" name="Picture 6" descr="Chart&#10;&#10;Description automatically generated">
+            <a:extLst>
+              <a:ext uri="{FF2B5EF4-FFF2-40B4-BE49-F238E27FC236}">
+                <a16:creationId xmlns:a16="http://schemas.microsoft.com/office/drawing/2014/main" id="{E34E0512-8276-C696-A9ED-B8A73819371A}"/>
+              </a:ext>
+            </a:extLst>
+          </p:cNvPr>
+          <p:cNvPicPr>
+            <a:picLocks noChangeAspect="1"/>
+          </p:cNvPicPr>
+          <p:nvPr/>
+        </p:nvPicPr>
+        <p:blipFill>
+          <a:blip r:embed="rId2"/>
+          <a:stretch>
+            <a:fillRect/>
+          </a:stretch>
+        </p:blipFill>
+        <p:spPr>
+          <a:xfrm>
+            <a:off x="1141412" y="2014663"/>
+            <a:ext cx="7772400" cy="4539556"/>
+          </a:xfrm>
+          <a:prstGeom prst="rect">
+            <a:avLst/>
+          </a:prstGeom>
+        </p:spPr>
+      </p:pic>
+    </p:spTree>
+    <p:extLst>
+      <p:ext uri="{BB962C8B-B14F-4D97-AF65-F5344CB8AC3E}">
+        <p14:creationId xmlns:p14="http://schemas.microsoft.com/office/powerpoint/2010/main" val="3690189321"/>
+      </p:ext>
+    </p:extLst>
+  </p:cSld>
+  <p:clrMapOvr>
+    <a:masterClrMapping/>
+  </p:clrMapOvr>
+</p:sld>
+</file>
+
+<file path=ppt/slides/slide7.xml><?xml version="1.0" encoding="utf-8"?>
+<p:sld xmlns:a="http://schemas.openxmlformats.org/drawingml/2006/main" xmlns:r="http://schemas.openxmlformats.org/officeDocument/2006/relationships" xmlns:p="http://schemas.openxmlformats.org/presentationml/2006/main">
+  <p:cSld>
+    <p:spTree>
+      <p:nvGrpSpPr>
+        <p:cNvPr id="1" name=""/>
+        <p:cNvGrpSpPr/>
+        <p:nvPr/>
+      </p:nvGrpSpPr>
+      <p:grpSpPr>
+        <a:xfrm>
+          <a:off x="0" y="0"/>
+          <a:ext cx="0" cy="0"/>
+          <a:chOff x="0" y="0"/>
+          <a:chExt cx="0" cy="0"/>
+        </a:xfrm>
+      </p:grpSpPr>
+      <p:sp>
+        <p:nvSpPr>
+          <p:cNvPr id="4" name="Title 1">
+            <a:extLst>
+              <a:ext uri="{FF2B5EF4-FFF2-40B4-BE49-F238E27FC236}">
+                <a16:creationId xmlns:a16="http://schemas.microsoft.com/office/drawing/2014/main" id="{7E0922D4-F157-8E7F-1896-A650730B9237}"/>
+              </a:ext>
+            </a:extLst>
+          </p:cNvPr>
+          <p:cNvSpPr>
+            <a:spLocks noGrp="1"/>
+          </p:cNvSpPr>
+          <p:nvPr>
+            <p:ph type="title"/>
+          </p:nvPr>
+        </p:nvSpPr>
+        <p:spPr>
+          <a:xfrm>
+            <a:off x="1141412" y="0"/>
+            <a:ext cx="5793643" cy="1251379"/>
+          </a:xfrm>
+        </p:spPr>
+        <p:txBody>
+          <a:bodyPr>
+            <a:normAutofit/>
+          </a:bodyPr>
+          <a:lstStyle/>
+          <a:p>
+            <a:r>
+              <a:rPr lang="en-US" dirty="0">
+                <a:solidFill>
+                  <a:schemeClr val="bg1">
+                    <a:lumMod val="85000"/>
+                    <a:lumOff val="15000"/>
+                  </a:schemeClr>
+                </a:solidFill>
+              </a:rPr>
+              <a:t>Model 1 (Results)</a:t>
+            </a:r>
+          </a:p>
+        </p:txBody>
+      </p:sp>
+      <p:sp>
+        <p:nvSpPr>
+          <p:cNvPr id="5" name="TextBox 4">
+            <a:extLst>
+              <a:ext uri="{FF2B5EF4-FFF2-40B4-BE49-F238E27FC236}">
+                <a16:creationId xmlns:a16="http://schemas.microsoft.com/office/drawing/2014/main" id="{267D5776-24FA-3A89-3505-8921BA4A2EC9}"/>
+              </a:ext>
+            </a:extLst>
+          </p:cNvPr>
+          <p:cNvSpPr txBox="1"/>
+          <p:nvPr/>
+        </p:nvSpPr>
+        <p:spPr>
+          <a:xfrm>
+            <a:off x="1141412" y="1251379"/>
+            <a:ext cx="6887976" cy="461665"/>
+          </a:xfrm>
+          <a:prstGeom prst="rect">
+            <a:avLst/>
+          </a:prstGeom>
+          <a:noFill/>
+        </p:spPr>
+        <p:txBody>
+          <a:bodyPr wrap="none" rtlCol="0">
+            <a:spAutoFit/>
+          </a:bodyPr>
+          <a:lstStyle/>
+          <a:p>
+            <a:r>
+              <a:rPr lang="en-US" sz="2400" dirty="0"/>
+              <a:t>Results of the model given random input images shown</a:t>
+            </a:r>
+          </a:p>
+        </p:txBody>
+      </p:sp>
+      <p:pic>
+        <p:nvPicPr>
+          <p:cNvPr id="6" name="Picture 5">
+            <a:extLst>
+              <a:ext uri="{FF2B5EF4-FFF2-40B4-BE49-F238E27FC236}">
+                <a16:creationId xmlns:a16="http://schemas.microsoft.com/office/drawing/2014/main" id="{7A20399A-1138-DB68-A7B4-4046FABDDE92}"/>
+              </a:ext>
+            </a:extLst>
+          </p:cNvPr>
+          <p:cNvPicPr>
+            <a:picLocks noChangeAspect="1"/>
+          </p:cNvPicPr>
+          <p:nvPr/>
+        </p:nvPicPr>
+        <p:blipFill>
+          <a:blip r:embed="rId2"/>
+          <a:stretch>
+            <a:fillRect/>
+          </a:stretch>
+        </p:blipFill>
+        <p:spPr>
+          <a:xfrm>
+            <a:off x="1141412" y="1946382"/>
+            <a:ext cx="4178300" cy="2184400"/>
+          </a:xfrm>
+          <a:prstGeom prst="rect">
+            <a:avLst/>
+          </a:prstGeom>
+        </p:spPr>
+      </p:pic>
+      <p:pic>
+        <p:nvPicPr>
+          <p:cNvPr id="7" name="Picture 6">
+            <a:extLst>
+              <a:ext uri="{FF2B5EF4-FFF2-40B4-BE49-F238E27FC236}">
+                <a16:creationId xmlns:a16="http://schemas.microsoft.com/office/drawing/2014/main" id="{F681F1D2-5304-ECF4-402B-8ABD1686E4D7}"/>
+              </a:ext>
+            </a:extLst>
+          </p:cNvPr>
+          <p:cNvPicPr>
+            <a:picLocks noChangeAspect="1"/>
+          </p:cNvPicPr>
+          <p:nvPr/>
+        </p:nvPicPr>
+        <p:blipFill>
+          <a:blip r:embed="rId3"/>
+          <a:stretch>
+            <a:fillRect/>
+          </a:stretch>
+        </p:blipFill>
+        <p:spPr>
+          <a:xfrm>
+            <a:off x="6872290" y="1946382"/>
+            <a:ext cx="4178300" cy="2184400"/>
+          </a:xfrm>
+          <a:prstGeom prst="rect">
+            <a:avLst/>
+          </a:prstGeom>
+        </p:spPr>
+      </p:pic>
+      <p:pic>
+        <p:nvPicPr>
+          <p:cNvPr id="8" name="Picture 7">
+            <a:extLst>
+              <a:ext uri="{FF2B5EF4-FFF2-40B4-BE49-F238E27FC236}">
+                <a16:creationId xmlns:a16="http://schemas.microsoft.com/office/drawing/2014/main" id="{DD902ABC-54C7-C47D-A71C-9F3AABB0FA8B}"/>
+              </a:ext>
+            </a:extLst>
+          </p:cNvPr>
+          <p:cNvPicPr>
+            <a:picLocks noChangeAspect="1"/>
+          </p:cNvPicPr>
+          <p:nvPr/>
+        </p:nvPicPr>
+        <p:blipFill>
+          <a:blip r:embed="rId4"/>
+          <a:stretch>
+            <a:fillRect/>
+          </a:stretch>
+        </p:blipFill>
+        <p:spPr>
+          <a:xfrm>
+            <a:off x="1141412" y="4364120"/>
+            <a:ext cx="4178300" cy="2184400"/>
+          </a:xfrm>
+          <a:prstGeom prst="rect">
+            <a:avLst/>
+          </a:prstGeom>
+        </p:spPr>
+      </p:pic>
+      <p:pic>
+        <p:nvPicPr>
+          <p:cNvPr id="9" name="Picture 8">
+            <a:extLst>
+              <a:ext uri="{FF2B5EF4-FFF2-40B4-BE49-F238E27FC236}">
+                <a16:creationId xmlns:a16="http://schemas.microsoft.com/office/drawing/2014/main" id="{F5941BCD-C01C-6A7B-13C5-8460D2B4ED10}"/>
+              </a:ext>
+            </a:extLst>
+          </p:cNvPr>
+          <p:cNvPicPr>
+            <a:picLocks noChangeAspect="1"/>
+          </p:cNvPicPr>
+          <p:nvPr/>
+        </p:nvPicPr>
+        <p:blipFill>
+          <a:blip r:embed="rId5"/>
+          <a:stretch>
+            <a:fillRect/>
+          </a:stretch>
+        </p:blipFill>
+        <p:spPr>
+          <a:xfrm>
+            <a:off x="6872288" y="4371826"/>
+            <a:ext cx="4178300" cy="2184400"/>
+          </a:xfrm>
+          <a:prstGeom prst="rect">
+            <a:avLst/>
+          </a:prstGeom>
+        </p:spPr>
+      </p:pic>
+    </p:spTree>
+    <p:extLst>
+      <p:ext uri="{BB962C8B-B14F-4D97-AF65-F5344CB8AC3E}">
+        <p14:creationId xmlns:p14="http://schemas.microsoft.com/office/powerpoint/2010/main" val="1108181937"/>
+      </p:ext>
+    </p:extLst>
+  </p:cSld>
+  <p:clrMapOvr>
+    <a:masterClrMapping/>
+  </p:clrMapOvr>
+</p:sld>
+</file>
+
+<file path=ppt/slides/slide8.xml><?xml version="1.0" encoding="utf-8"?>
+<p:sld xmlns:a="http://schemas.openxmlformats.org/drawingml/2006/main" xmlns:r="http://schemas.openxmlformats.org/officeDocument/2006/relationships" xmlns:p="http://schemas.openxmlformats.org/presentationml/2006/main">
+  <p:cSld>
+    <p:spTree>
+      <p:nvGrpSpPr>
+        <p:cNvPr id="1" name=""/>
+        <p:cNvGrpSpPr/>
+        <p:nvPr/>
+      </p:nvGrpSpPr>
+      <p:grpSpPr>
+        <a:xfrm>
+          <a:off x="0" y="0"/>
+          <a:ext cx="0" cy="0"/>
+          <a:chOff x="0" y="0"/>
+          <a:chExt cx="0" cy="0"/>
+        </a:xfrm>
+      </p:grpSpPr>
+      <p:sp>
+        <p:nvSpPr>
+          <p:cNvPr id="4" name="Title 1">
+            <a:extLst>
+              <a:ext uri="{FF2B5EF4-FFF2-40B4-BE49-F238E27FC236}">
+                <a16:creationId xmlns:a16="http://schemas.microsoft.com/office/drawing/2014/main" id="{5361A820-1380-CD1E-214A-EE4C38DEFBBF}"/>
+              </a:ext>
+            </a:extLst>
+          </p:cNvPr>
+          <p:cNvSpPr>
+            <a:spLocks noGrp="1"/>
+          </p:cNvSpPr>
+          <p:nvPr>
+            <p:ph type="title"/>
+          </p:nvPr>
+        </p:nvSpPr>
+        <p:spPr>
+          <a:xfrm>
+            <a:off x="1141412" y="0"/>
+            <a:ext cx="5793643" cy="1251379"/>
+          </a:xfrm>
+        </p:spPr>
+        <p:txBody>
+          <a:bodyPr>
+            <a:normAutofit/>
+          </a:bodyPr>
+          <a:lstStyle/>
+          <a:p>
+            <a:r>
+              <a:rPr lang="en-US" dirty="0">
+                <a:solidFill>
+                  <a:schemeClr val="bg1">
+                    <a:lumMod val="85000"/>
+                    <a:lumOff val="15000"/>
+                  </a:schemeClr>
+                </a:solidFill>
+              </a:rPr>
+              <a:t>Model 2</a:t>
+            </a:r>
+          </a:p>
+        </p:txBody>
+      </p:sp>
+      <p:sp>
+        <p:nvSpPr>
+          <p:cNvPr id="5" name="TextBox 4">
+            <a:extLst>
+              <a:ext uri="{FF2B5EF4-FFF2-40B4-BE49-F238E27FC236}">
+                <a16:creationId xmlns:a16="http://schemas.microsoft.com/office/drawing/2014/main" id="{1F89C839-7EBB-2B1D-6B1B-9F4CDF16147B}"/>
+              </a:ext>
+            </a:extLst>
+          </p:cNvPr>
+          <p:cNvSpPr txBox="1"/>
+          <p:nvPr/>
+        </p:nvSpPr>
+        <p:spPr>
+          <a:xfrm>
+            <a:off x="1141412" y="1251379"/>
+            <a:ext cx="6834948" cy="2308324"/>
+          </a:xfrm>
+          <a:prstGeom prst="rect">
+            <a:avLst/>
+          </a:prstGeom>
+          <a:noFill/>
+        </p:spPr>
+        <p:txBody>
+          <a:bodyPr wrap="none" rtlCol="0">
+            <a:spAutoFit/>
+          </a:bodyPr>
+          <a:lstStyle/>
+          <a:p>
+            <a:pPr marL="285750" indent="-285750">
+              <a:buFont typeface="Arial" panose="020B0604020202020204" pitchFamily="34" charset="0"/>
+              <a:buChar char="•"/>
+            </a:pPr>
+            <a:r>
+              <a:rPr lang="en-US" sz="2400" dirty="0"/>
+              <a:t>Implemented using 2 hidden layers &amp; 1 output layer</a:t>
+            </a:r>
+          </a:p>
+          <a:p>
+            <a:pPr marL="285750" indent="-285750">
+              <a:buFont typeface="Arial" panose="020B0604020202020204" pitchFamily="34" charset="0"/>
+              <a:buChar char="•"/>
+            </a:pPr>
+            <a:r>
+              <a:rPr lang="en-US" sz="2400" dirty="0"/>
+              <a:t>1</a:t>
+            </a:r>
+            <a:r>
+              <a:rPr lang="en-US" sz="2400" baseline="30000" dirty="0"/>
+              <a:t>st</a:t>
+            </a:r>
+            <a:r>
+              <a:rPr lang="en-US" sz="2400" dirty="0"/>
+              <a:t> Hidden Layer: tanh() </a:t>
+            </a:r>
+          </a:p>
+          <a:p>
+            <a:pPr marL="285750" indent="-285750">
+              <a:buFont typeface="Arial" panose="020B0604020202020204" pitchFamily="34" charset="0"/>
+              <a:buChar char="•"/>
+            </a:pPr>
+            <a:r>
+              <a:rPr lang="en-US" sz="2400" dirty="0"/>
+              <a:t>2</a:t>
+            </a:r>
+            <a:r>
+              <a:rPr lang="en-US" sz="2400" baseline="30000" dirty="0"/>
+              <a:t>nd</a:t>
+            </a:r>
+            <a:r>
+              <a:rPr lang="en-US" sz="2400" dirty="0"/>
+              <a:t> Hidden Layer: sigmoid()</a:t>
+            </a:r>
+          </a:p>
+          <a:p>
+            <a:pPr marL="285750" indent="-285750">
+              <a:buFont typeface="Arial" panose="020B0604020202020204" pitchFamily="34" charset="0"/>
+              <a:buChar char="•"/>
+            </a:pPr>
+            <a:r>
+              <a:rPr lang="en-US" sz="2400" dirty="0"/>
+              <a:t>Output layer: SoftMax()</a:t>
+            </a:r>
+          </a:p>
+          <a:p>
+            <a:pPr marL="285750" indent="-285750">
+              <a:buFont typeface="Arial" panose="020B0604020202020204" pitchFamily="34" charset="0"/>
+              <a:buChar char="•"/>
+            </a:pPr>
+            <a:r>
+              <a:rPr lang="en-US" sz="2400" dirty="0"/>
+              <a:t>1000 epochs</a:t>
+            </a:r>
+          </a:p>
+          <a:p>
+            <a:pPr marL="285750" indent="-285750">
+              <a:buFont typeface="Arial" panose="020B0604020202020204" pitchFamily="34" charset="0"/>
+              <a:buChar char="•"/>
+            </a:pPr>
+            <a:r>
+              <a:rPr lang="en-US" sz="2400" dirty="0"/>
+              <a:t>0.1 learning rate </a:t>
+            </a:r>
+          </a:p>
+        </p:txBody>
+      </p:sp>
+      <p:pic>
+        <p:nvPicPr>
+          <p:cNvPr id="6146" name="Picture 2" descr="Logistic Regression: Sigmoid Function Explained in Plain English">
+            <a:extLst>
+              <a:ext uri="{FF2B5EF4-FFF2-40B4-BE49-F238E27FC236}">
+                <a16:creationId xmlns:a16="http://schemas.microsoft.com/office/drawing/2014/main" id="{4CAFB630-F238-143F-E2B9-2D9D6A1D0AC7}"/>
+              </a:ext>
+            </a:extLst>
+          </p:cNvPr>
+          <p:cNvPicPr>
+            <a:picLocks noChangeAspect="1" noChangeArrowheads="1"/>
+          </p:cNvPicPr>
+          <p:nvPr/>
+        </p:nvPicPr>
+        <p:blipFill>
+          <a:blip r:embed="rId2">
+            <a:extLst>
+              <a:ext uri="{28A0092B-C50C-407E-A947-70E740481C1C}">
+                <a14:useLocalDpi xmlns:a14="http://schemas.microsoft.com/office/drawing/2010/main" val="0"/>
+              </a:ext>
+            </a:extLst>
+          </a:blip>
+          <a:srcRect/>
+          <a:stretch>
+            <a:fillRect/>
+          </a:stretch>
+        </p:blipFill>
+        <p:spPr bwMode="auto">
+          <a:xfrm>
+            <a:off x="1141412" y="3912663"/>
+            <a:ext cx="3739794" cy="2421925"/>
+          </a:xfrm>
+          <a:prstGeom prst="rect">
+            <a:avLst/>
+          </a:prstGeom>
+          <a:noFill/>
+          <a:extLst>
+            <a:ext uri="{909E8E84-426E-40DD-AFC4-6F175D3DCCD1}">
+              <a14:hiddenFill xmlns:a14="http://schemas.microsoft.com/office/drawing/2010/main">
+                <a:solidFill>
+                  <a:srgbClr val="FFFFFF"/>
+                </a:solidFill>
+              </a14:hiddenFill>
+            </a:ext>
+          </a:extLst>
+        </p:spPr>
+      </p:pic>
+      <p:pic>
+        <p:nvPicPr>
+          <p:cNvPr id="6148" name="Picture 4" descr="SoftMax Activation Function: Everything You Need To Know">
+            <a:extLst>
+              <a:ext uri="{FF2B5EF4-FFF2-40B4-BE49-F238E27FC236}">
+                <a16:creationId xmlns:a16="http://schemas.microsoft.com/office/drawing/2014/main" id="{3EEF9CF7-917D-208A-ECD2-9B0C2C0E30CC}"/>
+              </a:ext>
+            </a:extLst>
+          </p:cNvPr>
+          <p:cNvPicPr>
+            <a:picLocks noChangeAspect="1" noChangeArrowheads="1"/>
+          </p:cNvPicPr>
+          <p:nvPr/>
+        </p:nvPicPr>
+        <p:blipFill>
+          <a:blip r:embed="rId3">
+            <a:extLst>
+              <a:ext uri="{28A0092B-C50C-407E-A947-70E740481C1C}">
+                <a14:useLocalDpi xmlns:a14="http://schemas.microsoft.com/office/drawing/2010/main" val="0"/>
+              </a:ext>
+            </a:extLst>
+          </a:blip>
+          <a:srcRect/>
+          <a:stretch>
+            <a:fillRect/>
+          </a:stretch>
+        </p:blipFill>
+        <p:spPr bwMode="auto">
+          <a:xfrm>
+            <a:off x="7310796" y="3912663"/>
+            <a:ext cx="3466795" cy="2427501"/>
+          </a:xfrm>
+          <a:prstGeom prst="rect">
+            <a:avLst/>
+          </a:prstGeom>
+          <a:noFill/>
+          <a:extLst>
+            <a:ext uri="{909E8E84-426E-40DD-AFC4-6F175D3DCCD1}">
+              <a14:hiddenFill xmlns:a14="http://schemas.microsoft.com/office/drawing/2010/main">
+                <a:solidFill>
+                  <a:srgbClr val="FFFFFF"/>
+                </a:solidFill>
+              </a14:hiddenFill>
+            </a:ext>
+          </a:extLst>
+        </p:spPr>
+      </p:pic>
+    </p:spTree>
+    <p:extLst>
+      <p:ext uri="{BB962C8B-B14F-4D97-AF65-F5344CB8AC3E}">
+        <p14:creationId xmlns:p14="http://schemas.microsoft.com/office/powerpoint/2010/main" val="2213994059"/>
+      </p:ext>
+    </p:extLst>
+  </p:cSld>
+  <p:clrMapOvr>
+    <a:masterClrMapping/>
+  </p:clrMapOvr>
+</p:sld>
+</file>
+
+<file path=ppt/slides/slide9.xml><?xml version="1.0" encoding="utf-8"?>
+<p:sld xmlns:a="http://schemas.openxmlformats.org/drawingml/2006/main" xmlns:r="http://schemas.openxmlformats.org/officeDocument/2006/relationships" xmlns:p="http://schemas.openxmlformats.org/presentationml/2006/main">
+  <p:cSld>
+    <p:spTree>
+      <p:nvGrpSpPr>
+        <p:cNvPr id="1" name=""/>
+        <p:cNvGrpSpPr/>
+        <p:nvPr/>
+      </p:nvGrpSpPr>
+      <p:grpSpPr>
+        <a:xfrm>
+          <a:off x="0" y="0"/>
+          <a:ext cx="0" cy="0"/>
+          <a:chOff x="0" y="0"/>
+          <a:chExt cx="0" cy="0"/>
+        </a:xfrm>
+      </p:grpSpPr>
+      <p:sp>
+        <p:nvSpPr>
+          <p:cNvPr id="4" name="Title 1">
+            <a:extLst>
+              <a:ext uri="{FF2B5EF4-FFF2-40B4-BE49-F238E27FC236}">
+                <a16:creationId xmlns:a16="http://schemas.microsoft.com/office/drawing/2014/main" id="{06820669-0590-87BE-9A83-03C07E2041E3}"/>
+              </a:ext>
+            </a:extLst>
+          </p:cNvPr>
+          <p:cNvSpPr>
+            <a:spLocks noGrp="1"/>
+          </p:cNvSpPr>
+          <p:nvPr>
+            <p:ph type="title"/>
+          </p:nvPr>
+        </p:nvSpPr>
+        <p:spPr>
+          <a:xfrm>
+            <a:off x="1141412" y="0"/>
+            <a:ext cx="5793643" cy="1251379"/>
+          </a:xfrm>
+        </p:spPr>
+        <p:txBody>
+          <a:bodyPr>
+            <a:normAutofit/>
+          </a:bodyPr>
+          <a:lstStyle/>
+          <a:p>
+            <a:r>
+              <a:rPr lang="en-US" dirty="0">
+                <a:solidFill>
+                  <a:schemeClr val="bg1">
+                    <a:lumMod val="85000"/>
+                    <a:lumOff val="15000"/>
+                  </a:schemeClr>
+                </a:solidFill>
+              </a:rPr>
+              <a:t>Model 2 (Runtime &amp; Plots)</a:t>
+            </a:r>
+          </a:p>
+        </p:txBody>
+      </p:sp>
+      <p:sp>
+        <p:nvSpPr>
+          <p:cNvPr id="5" name="TextBox 4">
+            <a:extLst>
+              <a:ext uri="{FF2B5EF4-FFF2-40B4-BE49-F238E27FC236}">
+                <a16:creationId xmlns:a16="http://schemas.microsoft.com/office/drawing/2014/main" id="{99F8900F-FBBF-8CE8-1349-3DD4B1DAC754}"/>
+              </a:ext>
+            </a:extLst>
+          </p:cNvPr>
+          <p:cNvSpPr txBox="1"/>
+          <p:nvPr/>
+        </p:nvSpPr>
+        <p:spPr>
+          <a:xfrm>
+            <a:off x="1141412" y="1251379"/>
+            <a:ext cx="8753871" cy="461665"/>
+          </a:xfrm>
+          <a:prstGeom prst="rect">
+            <a:avLst/>
+          </a:prstGeom>
+          <a:noFill/>
+        </p:spPr>
+        <p:txBody>
+          <a:bodyPr wrap="none" rtlCol="0">
+            <a:spAutoFit/>
+          </a:bodyPr>
+          <a:lstStyle/>
+          <a:p>
+            <a:r>
+              <a:rPr lang="en-US" sz="2400" dirty="0"/>
+              <a:t>Time taken to train the model as well as accuracy and loss plots shown</a:t>
+            </a:r>
+          </a:p>
+        </p:txBody>
+      </p:sp>
+      <p:pic>
+        <p:nvPicPr>
+          <p:cNvPr id="7" name="Picture 6" descr="Chart&#10;&#10;Description automatically generated">
+            <a:extLst>
+              <a:ext uri="{FF2B5EF4-FFF2-40B4-BE49-F238E27FC236}">
+                <a16:creationId xmlns:a16="http://schemas.microsoft.com/office/drawing/2014/main" id="{80715D9D-3C7B-A4B7-87EC-54B999A84C2B}"/>
+              </a:ext>
+            </a:extLst>
+          </p:cNvPr>
+          <p:cNvPicPr>
+            <a:picLocks noChangeAspect="1"/>
+          </p:cNvPicPr>
+          <p:nvPr/>
+        </p:nvPicPr>
+        <p:blipFill>
+          <a:blip r:embed="rId2"/>
+          <a:stretch>
+            <a:fillRect/>
+          </a:stretch>
+        </p:blipFill>
+        <p:spPr>
+          <a:xfrm>
+            <a:off x="1141412" y="1887705"/>
+            <a:ext cx="7772400" cy="4759264"/>
+          </a:xfrm>
+          <a:prstGeom prst="rect">
+            <a:avLst/>
+          </a:prstGeom>
+        </p:spPr>
+      </p:pic>
+    </p:spTree>
+    <p:extLst>
+      <p:ext uri="{BB962C8B-B14F-4D97-AF65-F5344CB8AC3E}">
+        <p14:creationId xmlns:p14="http://schemas.microsoft.com/office/powerpoint/2010/main" val="189701726"/>
       </p:ext>
     </p:extLst>
   </p:cSld>

</xml_diff>